<commit_message>
Update Slide Import Excel
</commit_message>
<xml_diff>
--- a/ smart-buy/Stuff/DungTT/Slide/Import Excel.pptx
+++ b/ smart-buy/Stuff/DungTT/Slide/Import Excel.pptx
@@ -7367,20 +7367,7 @@
                   </a:outerShdw>
                 </a:effectLst>
               </a:rPr>
-              <a:t>Duplicate</a:t>
-            </a:r>
-            <a:r>
-              <a:rPr lang="en-US" dirty="0" smtClean="0">
-                <a:solidFill>
-                  <a:srgbClr val="000000"/>
-                </a:solidFill>
-                <a:effectLst>
-                  <a:outerShdw blurRad="38100" dist="38100" dir="2700000" algn="tl">
-                    <a:srgbClr val="C0C0C0"/>
-                  </a:outerShdw>
-                </a:effectLst>
-              </a:rPr>
-              <a:t> products</a:t>
+              <a:t>Duplicate products</a:t>
             </a:r>
             <a:endParaRPr lang="en-US" dirty="0">
               <a:solidFill>
@@ -7499,20 +7486,7 @@
                   </a:outerShdw>
                 </a:effectLst>
               </a:rPr>
-              <a:t>Correct</a:t>
-            </a:r>
-            <a:r>
-              <a:rPr lang="en-US" dirty="0" smtClean="0">
-                <a:solidFill>
-                  <a:srgbClr val="000000"/>
-                </a:solidFill>
-                <a:effectLst>
-                  <a:outerShdw blurRad="38100" dist="38100" dir="2700000" algn="tl">
-                    <a:srgbClr val="C0C0C0"/>
-                  </a:outerShdw>
-                </a:effectLst>
-              </a:rPr>
-              <a:t> products</a:t>
+              <a:t>Correct products</a:t>
             </a:r>
             <a:endParaRPr lang="en-US" dirty="0">
               <a:solidFill>
@@ -7529,7 +7503,7 @@
       </p:sp>
       <p:pic>
         <p:nvPicPr>
-          <p:cNvPr id="3" name="Picture 2"/>
+          <p:cNvPr id="2" name="Picture 1"/>
           <p:cNvPicPr>
             <a:picLocks noChangeAspect="1"/>
           </p:cNvPicPr>
@@ -7549,8 +7523,8 @@
         </p:blipFill>
         <p:spPr>
           <a:xfrm>
-            <a:off x="1828800" y="1371600"/>
-            <a:ext cx="5624713" cy="5486400"/>
+            <a:off x="1676400" y="1295400"/>
+            <a:ext cx="5496645" cy="5361481"/>
           </a:xfrm>
           <a:prstGeom prst="rect">
             <a:avLst/>

</xml_diff>